<commit_message>
Inclusion of Slide 17
</commit_message>
<xml_diff>
--- a/PresentationContent/Assignment1.pptx
+++ b/PresentationContent/Assignment1.pptx
@@ -6,7 +6,7 @@
     <p:sldMasterId id="2147483696" r:id="rId2"/>
   </p:sldMasterIdLst>
   <p:notesMasterIdLst>
-    <p:notesMasterId r:id="rId19"/>
+    <p:notesMasterId r:id="rId20"/>
   </p:notesMasterIdLst>
   <p:sldIdLst>
     <p:sldId id="256" r:id="rId3"/>
@@ -25,6 +25,7 @@
     <p:sldId id="271" r:id="rId16"/>
     <p:sldId id="272" r:id="rId17"/>
     <p:sldId id="273" r:id="rId18"/>
+    <p:sldId id="274" r:id="rId19"/>
   </p:sldIdLst>
   <p:sldSz cx="9144000" cy="6858000" type="screen4x3"/>
   <p:notesSz cx="6858000" cy="9144000"/>
@@ -224,7 +225,7 @@
           <a:p>
             <a:fld id="{31F9249A-79F9-4CD3-B442-F888844EAF12}" type="datetimeFigureOut">
               <a:rPr lang="en-IN" smtClean="0"/>
-              <a:t>21-04-2016</a:t>
+              <a:t>27-04-2016</a:t>
             </a:fld>
             <a:endParaRPr lang="en-IN"/>
           </a:p>
@@ -851,7 +852,7 @@
           <a:p>
             <a:fld id="{AC3A43BB-4DE7-4958-83ED-55FAE498521B}" type="datetime1">
               <a:rPr lang="en-US" smtClean="0"/>
-              <a:t>4/21/2016</a:t>
+              <a:t>4/27/2016</a:t>
             </a:fld>
             <a:endParaRPr lang="en-US"/>
           </a:p>
@@ -1240,7 +1241,7 @@
           <a:p>
             <a:fld id="{96FA2A15-C180-4493-8DCC-578212C315B8}" type="datetime1">
               <a:rPr lang="en-US" smtClean="0"/>
-              <a:t>4/21/2016</a:t>
+              <a:t>4/27/2016</a:t>
             </a:fld>
             <a:endParaRPr lang="en-US"/>
           </a:p>
@@ -1769,7 +1770,7 @@
           <a:p>
             <a:fld id="{5902838E-7E0A-440A-AA35-2BE7FC3E239D}" type="datetime1">
               <a:rPr lang="en-US" smtClean="0"/>
-              <a:t>4/21/2016</a:t>
+              <a:t>4/27/2016</a:t>
             </a:fld>
             <a:endParaRPr lang="en-US"/>
           </a:p>
@@ -1961,7 +1962,7 @@
           <a:p>
             <a:fld id="{AC3A43BB-4DE7-4958-83ED-55FAE498521B}" type="datetime1">
               <a:rPr lang="en-US" smtClean="0"/>
-              <a:t>4/21/2016</a:t>
+              <a:t>4/27/2016</a:t>
             </a:fld>
             <a:endParaRPr lang="en-US"/>
           </a:p>
@@ -2132,7 +2133,7 @@
           <a:p>
             <a:fld id="{73806EA8-605C-4B80-8E6D-F9B8EFA6B49A}" type="datetime1">
               <a:rPr lang="en-US" smtClean="0"/>
-              <a:t>4/21/2016</a:t>
+              <a:t>4/27/2016</a:t>
             </a:fld>
             <a:endParaRPr lang="en-US"/>
           </a:p>
@@ -2379,7 +2380,7 @@
           <a:p>
             <a:fld id="{C2C6FE5B-BD8C-491C-AE0A-5A1CC7FC2F48}" type="datetime1">
               <a:rPr lang="en-US" smtClean="0"/>
-              <a:t>4/21/2016</a:t>
+              <a:t>4/27/2016</a:t>
             </a:fld>
             <a:endParaRPr lang="en-US"/>
           </a:p>
@@ -2612,7 +2613,7 @@
           <a:p>
             <a:fld id="{1271ACD4-DB38-4899-96DD-B1849A7F2DC3}" type="datetime1">
               <a:rPr lang="en-US" smtClean="0"/>
-              <a:t>4/21/2016</a:t>
+              <a:t>4/27/2016</a:t>
             </a:fld>
             <a:endParaRPr lang="en-US"/>
           </a:p>
@@ -2980,7 +2981,7 @@
           <a:p>
             <a:fld id="{EF56C449-A1DB-401D-97B1-FEAA65FCDD2A}" type="datetime1">
               <a:rPr lang="en-US" smtClean="0"/>
-              <a:t>4/21/2016</a:t>
+              <a:t>4/27/2016</a:t>
             </a:fld>
             <a:endParaRPr lang="en-US"/>
           </a:p>
@@ -3099,7 +3100,7 @@
           <a:p>
             <a:fld id="{1F3664C8-925E-4007-865C-F6DFD4EFFAC2}" type="datetime1">
               <a:rPr lang="en-US" smtClean="0"/>
-              <a:t>4/21/2016</a:t>
+              <a:t>4/27/2016</a:t>
             </a:fld>
             <a:endParaRPr lang="en-US"/>
           </a:p>
@@ -3195,7 +3196,7 @@
           <a:p>
             <a:fld id="{553D461B-88D4-4F7A-A3CE-4458A07EF4E5}" type="datetime1">
               <a:rPr lang="en-US" smtClean="0"/>
-              <a:t>4/21/2016</a:t>
+              <a:t>4/27/2016</a:t>
             </a:fld>
             <a:endParaRPr lang="en-US"/>
           </a:p>
@@ -3473,7 +3474,7 @@
           <a:p>
             <a:fld id="{C0F2054D-1FF6-40A0-8A9A-894E5DFAB06F}" type="datetime1">
               <a:rPr lang="en-US" smtClean="0"/>
-              <a:t>4/21/2016</a:t>
+              <a:t>4/27/2016</a:t>
             </a:fld>
             <a:endParaRPr lang="en-US"/>
           </a:p>
@@ -3602,7 +3603,7 @@
           <a:p>
             <a:fld id="{73806EA8-605C-4B80-8E6D-F9B8EFA6B49A}" type="datetime1">
               <a:rPr lang="en-US" smtClean="0"/>
-              <a:t>4/21/2016</a:t>
+              <a:t>4/27/2016</a:t>
             </a:fld>
             <a:endParaRPr lang="en-US"/>
           </a:p>
@@ -3913,7 +3914,7 @@
           <a:p>
             <a:fld id="{8263195D-E909-4D22-BA67-766267670AE0}" type="datetime1">
               <a:rPr lang="en-US" smtClean="0"/>
-              <a:t>4/21/2016</a:t>
+              <a:t>4/27/2016</a:t>
             </a:fld>
             <a:endParaRPr lang="en-US"/>
           </a:p>
@@ -4084,7 +4085,7 @@
           <a:p>
             <a:fld id="{96FA2A15-C180-4493-8DCC-578212C315B8}" type="datetime1">
               <a:rPr lang="en-US" smtClean="0"/>
-              <a:t>4/21/2016</a:t>
+              <a:t>4/27/2016</a:t>
             </a:fld>
             <a:endParaRPr lang="en-US"/>
           </a:p>
@@ -4265,7 +4266,7 @@
           <a:p>
             <a:fld id="{5902838E-7E0A-440A-AA35-2BE7FC3E239D}" type="datetime1">
               <a:rPr lang="en-US" smtClean="0"/>
-              <a:t>4/21/2016</a:t>
+              <a:t>4/27/2016</a:t>
             </a:fld>
             <a:endParaRPr lang="en-US"/>
           </a:p>
@@ -4747,7 +4748,7 @@
           <a:p>
             <a:fld id="{C2C6FE5B-BD8C-491C-AE0A-5A1CC7FC2F48}" type="datetime1">
               <a:rPr lang="en-US" smtClean="0"/>
-              <a:t>4/21/2016</a:t>
+              <a:t>4/27/2016</a:t>
             </a:fld>
             <a:endParaRPr lang="en-US"/>
           </a:p>
@@ -5038,7 +5039,7 @@
           <a:p>
             <a:fld id="{1271ACD4-DB38-4899-96DD-B1849A7F2DC3}" type="datetime1">
               <a:rPr lang="en-US" smtClean="0"/>
-              <a:t>4/21/2016</a:t>
+              <a:t>4/27/2016</a:t>
             </a:fld>
             <a:endParaRPr lang="en-US"/>
           </a:p>
@@ -5693,7 +5694,7 @@
           <a:p>
             <a:fld id="{EF56C449-A1DB-401D-97B1-FEAA65FCDD2A}" type="datetime1">
               <a:rPr lang="en-US" smtClean="0"/>
-              <a:t>4/21/2016</a:t>
+              <a:t>4/27/2016</a:t>
             </a:fld>
             <a:endParaRPr lang="en-US"/>
           </a:p>
@@ -6130,7 +6131,7 @@
           <a:p>
             <a:fld id="{1F3664C8-925E-4007-865C-F6DFD4EFFAC2}" type="datetime1">
               <a:rPr lang="en-US" smtClean="0"/>
-              <a:t>4/21/2016</a:t>
+              <a:t>4/27/2016</a:t>
             </a:fld>
             <a:endParaRPr lang="en-US"/>
           </a:p>
@@ -6444,7 +6445,7 @@
           <a:p>
             <a:fld id="{553D461B-88D4-4F7A-A3CE-4458A07EF4E5}" type="datetime1">
               <a:rPr lang="en-US" smtClean="0"/>
-              <a:t>4/21/2016</a:t>
+              <a:t>4/27/2016</a:t>
             </a:fld>
             <a:endParaRPr lang="en-US"/>
           </a:p>
@@ -7173,7 +7174,7 @@
           <a:p>
             <a:fld id="{C0F2054D-1FF6-40A0-8A9A-894E5DFAB06F}" type="datetime1">
               <a:rPr lang="en-US" smtClean="0"/>
-              <a:t>4/21/2016</a:t>
+              <a:t>4/27/2016</a:t>
             </a:fld>
             <a:endParaRPr lang="en-US"/>
           </a:p>
@@ -7838,7 +7839,7 @@
           <a:p>
             <a:fld id="{8263195D-E909-4D22-BA67-766267670AE0}" type="datetime1">
               <a:rPr lang="en-US" smtClean="0"/>
-              <a:t>4/21/2016</a:t>
+              <a:t>4/27/2016</a:t>
             </a:fld>
             <a:endParaRPr lang="en-US"/>
           </a:p>
@@ -8114,7 +8115,7 @@
           <a:p>
             <a:fld id="{D5B3F0E9-A7BB-46C8-869B-EF3E697A6B03}" type="datetime1">
               <a:rPr lang="en-US" smtClean="0"/>
-              <a:t>4/21/2016</a:t>
+              <a:t>4/27/2016</a:t>
             </a:fld>
             <a:endParaRPr lang="en-US"/>
           </a:p>
@@ -8924,7 +8925,7 @@
           <a:p>
             <a:fld id="{D5B3F0E9-A7BB-46C8-869B-EF3E697A6B03}" type="datetime1">
               <a:rPr lang="en-US" smtClean="0"/>
-              <a:t>4/21/2016</a:t>
+              <a:t>4/27/2016</a:t>
             </a:fld>
             <a:endParaRPr lang="en-US"/>
           </a:p>
@@ -10489,6 +10490,128 @@
     <p:extLst>
       <p:ext uri="{BB962C8B-B14F-4D97-AF65-F5344CB8AC3E}">
         <p14:creationId xmlns:p14="http://schemas.microsoft.com/office/powerpoint/2010/main" val="4041086865"/>
+      </p:ext>
+    </p:extLst>
+  </p:cSld>
+  <p:clrMapOvr>
+    <a:masterClrMapping/>
+  </p:clrMapOvr>
+</p:sld>
+</file>
+
+<file path=ppt/slides/slide17.xml><?xml version="1.0" encoding="utf-8"?>
+<p:sld xmlns:a="http://schemas.openxmlformats.org/drawingml/2006/main" xmlns:r="http://schemas.openxmlformats.org/officeDocument/2006/relationships" xmlns:p="http://schemas.openxmlformats.org/presentationml/2006/main">
+  <p:cSld>
+    <p:spTree>
+      <p:nvGrpSpPr>
+        <p:cNvPr id="1" name=""/>
+        <p:cNvGrpSpPr/>
+        <p:nvPr/>
+      </p:nvGrpSpPr>
+      <p:grpSpPr>
+        <a:xfrm>
+          <a:off x="0" y="0"/>
+          <a:ext cx="0" cy="0"/>
+          <a:chOff x="0" y="0"/>
+          <a:chExt cx="0" cy="0"/>
+        </a:xfrm>
+      </p:grpSpPr>
+      <p:sp>
+        <p:nvSpPr>
+          <p:cNvPr id="2" name="TextBox 1"/>
+          <p:cNvSpPr txBox="1"/>
+          <p:nvPr/>
+        </p:nvSpPr>
+        <p:spPr>
+          <a:xfrm>
+            <a:off x="914400" y="259140"/>
+            <a:ext cx="8096540" cy="1569660"/>
+          </a:xfrm>
+          <a:prstGeom prst="rect">
+            <a:avLst/>
+          </a:prstGeom>
+          <a:noFill/>
+        </p:spPr>
+        <p:txBody>
+          <a:bodyPr wrap="square" rtlCol="0">
+            <a:spAutoFit/>
+          </a:bodyPr>
+          <a:lstStyle/>
+          <a:p>
+            <a:r>
+              <a:rPr lang="en-US" sz="2400" dirty="0" smtClean="0">
+                <a:solidFill>
+                  <a:srgbClr val="002060"/>
+                </a:solidFill>
+                <a:latin typeface="Times New Roman" panose="02020603050405020304" pitchFamily="18" charset="0"/>
+                <a:cs typeface="Times New Roman" panose="02020603050405020304" pitchFamily="18" charset="0"/>
+              </a:rPr>
+              <a:t>1.8</a:t>
+            </a:r>
+            <a:endParaRPr lang="en-US" sz="2400" dirty="0" smtClean="0">
+              <a:solidFill>
+                <a:srgbClr val="002060"/>
+              </a:solidFill>
+              <a:latin typeface="Times New Roman" panose="02020603050405020304" pitchFamily="18" charset="0"/>
+              <a:cs typeface="Times New Roman" panose="02020603050405020304" pitchFamily="18" charset="0"/>
+            </a:endParaRPr>
+          </a:p>
+          <a:p>
+            <a:endParaRPr lang="en-US" sz="2400" dirty="0" smtClean="0">
+              <a:solidFill>
+                <a:srgbClr val="002060"/>
+              </a:solidFill>
+              <a:latin typeface="Times New Roman" panose="02020603050405020304" pitchFamily="18" charset="0"/>
+              <a:cs typeface="Times New Roman" panose="02020603050405020304" pitchFamily="18" charset="0"/>
+            </a:endParaRPr>
+          </a:p>
+          <a:p>
+            <a:r>
+              <a:rPr lang="en-US" sz="2400" dirty="0" smtClean="0">
+                <a:solidFill>
+                  <a:srgbClr val="002060"/>
+                </a:solidFill>
+                <a:latin typeface="Times New Roman" panose="02020603050405020304" pitchFamily="18" charset="0"/>
+                <a:cs typeface="Times New Roman" panose="02020603050405020304" pitchFamily="18" charset="0"/>
+              </a:rPr>
+              <a:t>Resorted to shell scripting.</a:t>
+            </a:r>
+          </a:p>
+          <a:p>
+            <a:r>
+              <a:rPr lang="en-US" sz="2400" smtClean="0">
+                <a:solidFill>
+                  <a:srgbClr val="002060"/>
+                </a:solidFill>
+                <a:latin typeface="Times New Roman" panose="02020603050405020304" pitchFamily="18" charset="0"/>
+                <a:cs typeface="Times New Roman" panose="02020603050405020304" pitchFamily="18" charset="0"/>
+              </a:rPr>
+              <a:t>Video &amp; README </a:t>
+            </a:r>
+            <a:r>
+              <a:rPr lang="en-US" sz="2400" dirty="0" smtClean="0">
+                <a:solidFill>
+                  <a:srgbClr val="002060"/>
+                </a:solidFill>
+                <a:latin typeface="Times New Roman" panose="02020603050405020304" pitchFamily="18" charset="0"/>
+                <a:cs typeface="Times New Roman" panose="02020603050405020304" pitchFamily="18" charset="0"/>
+              </a:rPr>
+              <a:t>for further reference</a:t>
+            </a:r>
+            <a:endParaRPr lang="en-US" sz="2400" dirty="0" smtClean="0">
+              <a:solidFill>
+                <a:srgbClr val="002060"/>
+              </a:solidFill>
+              <a:latin typeface="Times New Roman" panose="02020603050405020304" pitchFamily="18" charset="0"/>
+              <a:cs typeface="Times New Roman" panose="02020603050405020304" pitchFamily="18" charset="0"/>
+            </a:endParaRPr>
+          </a:p>
+        </p:txBody>
+      </p:sp>
+    </p:spTree>
+    <p:extLst>
+      <p:ext uri="{BB962C8B-B14F-4D97-AF65-F5344CB8AC3E}">
+        <p14:creationId xmlns:p14="http://schemas.microsoft.com/office/powerpoint/2010/main" val="613042106"/>
       </p:ext>
     </p:extLst>
   </p:cSld>

</xml_diff>